<commit_message>
Se agrega sweet alert
</commit_message>
<xml_diff>
--- a/Documentacion/ModeloDeDominio.pptx
+++ b/Documentacion/ModeloDeDominio.pptx
@@ -288,7 +288,7 @@
           <a:p>
             <a:fld id="{CD21808B-F1F7-449E-A2DD-9D82A70BF94C}" type="datetimeFigureOut">
               <a:rPr lang="es-ES" smtClean="0"/>
-              <a:t>02/11/2016</a:t>
+              <a:t>27/11/2016</a:t>
             </a:fld>
             <a:endParaRPr lang="es-ES"/>
           </a:p>
@@ -458,7 +458,7 @@
           <a:p>
             <a:fld id="{CD21808B-F1F7-449E-A2DD-9D82A70BF94C}" type="datetimeFigureOut">
               <a:rPr lang="es-ES" smtClean="0"/>
-              <a:t>02/11/2016</a:t>
+              <a:t>27/11/2016</a:t>
             </a:fld>
             <a:endParaRPr lang="es-ES"/>
           </a:p>
@@ -638,7 +638,7 @@
           <a:p>
             <a:fld id="{CD21808B-F1F7-449E-A2DD-9D82A70BF94C}" type="datetimeFigureOut">
               <a:rPr lang="es-ES" smtClean="0"/>
-              <a:t>02/11/2016</a:t>
+              <a:t>27/11/2016</a:t>
             </a:fld>
             <a:endParaRPr lang="es-ES"/>
           </a:p>
@@ -808,7 +808,7 @@
           <a:p>
             <a:fld id="{CD21808B-F1F7-449E-A2DD-9D82A70BF94C}" type="datetimeFigureOut">
               <a:rPr lang="es-ES" smtClean="0"/>
-              <a:t>02/11/2016</a:t>
+              <a:t>27/11/2016</a:t>
             </a:fld>
             <a:endParaRPr lang="es-ES"/>
           </a:p>
@@ -1054,7 +1054,7 @@
           <a:p>
             <a:fld id="{CD21808B-F1F7-449E-A2DD-9D82A70BF94C}" type="datetimeFigureOut">
               <a:rPr lang="es-ES" smtClean="0"/>
-              <a:t>02/11/2016</a:t>
+              <a:t>27/11/2016</a:t>
             </a:fld>
             <a:endParaRPr lang="es-ES"/>
           </a:p>
@@ -1342,7 +1342,7 @@
           <a:p>
             <a:fld id="{CD21808B-F1F7-449E-A2DD-9D82A70BF94C}" type="datetimeFigureOut">
               <a:rPr lang="es-ES" smtClean="0"/>
-              <a:t>02/11/2016</a:t>
+              <a:t>27/11/2016</a:t>
             </a:fld>
             <a:endParaRPr lang="es-ES"/>
           </a:p>
@@ -1764,7 +1764,7 @@
           <a:p>
             <a:fld id="{CD21808B-F1F7-449E-A2DD-9D82A70BF94C}" type="datetimeFigureOut">
               <a:rPr lang="es-ES" smtClean="0"/>
-              <a:t>02/11/2016</a:t>
+              <a:t>27/11/2016</a:t>
             </a:fld>
             <a:endParaRPr lang="es-ES"/>
           </a:p>
@@ -1882,7 +1882,7 @@
           <a:p>
             <a:fld id="{CD21808B-F1F7-449E-A2DD-9D82A70BF94C}" type="datetimeFigureOut">
               <a:rPr lang="es-ES" smtClean="0"/>
-              <a:t>02/11/2016</a:t>
+              <a:t>27/11/2016</a:t>
             </a:fld>
             <a:endParaRPr lang="es-ES"/>
           </a:p>
@@ -1977,7 +1977,7 @@
           <a:p>
             <a:fld id="{CD21808B-F1F7-449E-A2DD-9D82A70BF94C}" type="datetimeFigureOut">
               <a:rPr lang="es-ES" smtClean="0"/>
-              <a:t>02/11/2016</a:t>
+              <a:t>27/11/2016</a:t>
             </a:fld>
             <a:endParaRPr lang="es-ES"/>
           </a:p>
@@ -2254,7 +2254,7 @@
           <a:p>
             <a:fld id="{CD21808B-F1F7-449E-A2DD-9D82A70BF94C}" type="datetimeFigureOut">
               <a:rPr lang="es-ES" smtClean="0"/>
-              <a:t>02/11/2016</a:t>
+              <a:t>27/11/2016</a:t>
             </a:fld>
             <a:endParaRPr lang="es-ES"/>
           </a:p>
@@ -2507,7 +2507,7 @@
           <a:p>
             <a:fld id="{CD21808B-F1F7-449E-A2DD-9D82A70BF94C}" type="datetimeFigureOut">
               <a:rPr lang="es-ES" smtClean="0"/>
-              <a:t>02/11/2016</a:t>
+              <a:t>27/11/2016</a:t>
             </a:fld>
             <a:endParaRPr lang="es-ES"/>
           </a:p>
@@ -2720,7 +2720,7 @@
           <a:p>
             <a:fld id="{CD21808B-F1F7-449E-A2DD-9D82A70BF94C}" type="datetimeFigureOut">
               <a:rPr lang="es-ES" smtClean="0"/>
-              <a:t>02/11/2016</a:t>
+              <a:t>27/11/2016</a:t>
             </a:fld>
             <a:endParaRPr lang="es-ES"/>
           </a:p>
@@ -3097,55 +3097,901 @@
       </p:grpSpPr>
       <p:grpSp>
         <p:nvGrpSpPr>
-          <p:cNvPr id="13" name="12 Grupo"/>
+          <p:cNvPr id="3" name="2 Grupo"/>
           <p:cNvGrpSpPr/>
           <p:nvPr/>
         </p:nvGrpSpPr>
         <p:grpSpPr>
           <a:xfrm>
-            <a:off x="223656" y="2666529"/>
-            <a:ext cx="1800200" cy="2083552"/>
-            <a:chOff x="1128223" y="1988452"/>
-            <a:chExt cx="1656184" cy="1151399"/>
+            <a:off x="203084" y="188640"/>
+            <a:ext cx="8679551" cy="6629013"/>
+            <a:chOff x="203084" y="188640"/>
+            <a:chExt cx="8679551" cy="6629013"/>
           </a:xfrm>
         </p:grpSpPr>
-        <p:sp>
-          <p:nvSpPr>
-            <p:cNvPr id="4" name="3 Rectángulo"/>
-            <p:cNvSpPr/>
+        <p:grpSp>
+          <p:nvGrpSpPr>
+            <p:cNvPr id="13" name="12 Grupo"/>
+            <p:cNvGrpSpPr/>
             <p:nvPr/>
-          </p:nvSpPr>
+          </p:nvGrpSpPr>
+          <p:grpSpPr>
+            <a:xfrm>
+              <a:off x="223656" y="2666529"/>
+              <a:ext cx="1800200" cy="2083552"/>
+              <a:chOff x="1128223" y="1988452"/>
+              <a:chExt cx="1656184" cy="1151399"/>
+            </a:xfrm>
+          </p:grpSpPr>
+          <p:sp>
+            <p:nvSpPr>
+              <p:cNvPr id="4" name="3 Rectángulo"/>
+              <p:cNvSpPr/>
+              <p:nvPr/>
+            </p:nvSpPr>
+            <p:spPr>
+              <a:xfrm>
+                <a:off x="1128223" y="1988452"/>
+                <a:ext cx="1656184" cy="390880"/>
+              </a:xfrm>
+              <a:prstGeom prst="rect">
+                <a:avLst/>
+              </a:prstGeom>
+            </p:spPr>
+            <p:style>
+              <a:lnRef idx="2">
+                <a:schemeClr val="accent1"/>
+              </a:lnRef>
+              <a:fillRef idx="1">
+                <a:schemeClr val="lt1"/>
+              </a:fillRef>
+              <a:effectRef idx="0">
+                <a:schemeClr val="accent1"/>
+              </a:effectRef>
+              <a:fontRef idx="minor">
+                <a:schemeClr val="dk1"/>
+              </a:fontRef>
+            </p:style>
+            <p:txBody>
+              <a:bodyPr rtlCol="0" anchor="ctr"/>
+              <a:lstStyle/>
+              <a:p>
+                <a:pPr algn="ctr"/>
+                <a:r>
+                  <a:rPr lang="es-ES" dirty="0" smtClean="0"/>
+                  <a:t>Producto</a:t>
+                </a:r>
+                <a:endParaRPr lang="es-ES" dirty="0"/>
+              </a:p>
+            </p:txBody>
+          </p:sp>
+          <p:sp>
+            <p:nvSpPr>
+              <p:cNvPr id="12" name="11 Rectángulo"/>
+              <p:cNvSpPr/>
+              <p:nvPr/>
+            </p:nvSpPr>
+            <p:spPr>
+              <a:xfrm>
+                <a:off x="1128223" y="2379332"/>
+                <a:ext cx="1656184" cy="760519"/>
+              </a:xfrm>
+              <a:prstGeom prst="rect">
+                <a:avLst/>
+              </a:prstGeom>
+            </p:spPr>
+            <p:style>
+              <a:lnRef idx="2">
+                <a:schemeClr val="accent1"/>
+              </a:lnRef>
+              <a:fillRef idx="1">
+                <a:schemeClr val="lt1"/>
+              </a:fillRef>
+              <a:effectRef idx="0">
+                <a:schemeClr val="accent1"/>
+              </a:effectRef>
+              <a:fontRef idx="minor">
+                <a:schemeClr val="dk1"/>
+              </a:fontRef>
+            </p:style>
+            <p:txBody>
+              <a:bodyPr rtlCol="0" anchor="ctr"/>
+              <a:lstStyle/>
+              <a:p>
+                <a:pPr algn="ctr"/>
+                <a:r>
+                  <a:rPr lang="es-ES" dirty="0" smtClean="0"/>
+                  <a:t>Código</a:t>
+                </a:r>
+              </a:p>
+              <a:p>
+                <a:pPr algn="ctr"/>
+                <a:r>
+                  <a:rPr lang="es-ES" dirty="0" smtClean="0"/>
+                  <a:t>Precio</a:t>
+                </a:r>
+              </a:p>
+              <a:p>
+                <a:pPr algn="ctr"/>
+                <a:r>
+                  <a:rPr lang="es-ES" dirty="0" smtClean="0"/>
+                  <a:t>Talla</a:t>
+                </a:r>
+              </a:p>
+              <a:p>
+                <a:pPr algn="ctr"/>
+                <a:r>
+                  <a:rPr lang="es-ES" dirty="0" smtClean="0"/>
+                  <a:t>Color</a:t>
+                </a:r>
+                <a:endParaRPr lang="es-ES" dirty="0"/>
+              </a:p>
+              <a:p>
+                <a:pPr algn="ctr"/>
+                <a:endParaRPr lang="es-ES" dirty="0" smtClean="0"/>
+              </a:p>
+            </p:txBody>
+          </p:sp>
+        </p:grpSp>
+        <p:grpSp>
+          <p:nvGrpSpPr>
+            <p:cNvPr id="16" name="15 Grupo"/>
+            <p:cNvGrpSpPr/>
+            <p:nvPr/>
+          </p:nvGrpSpPr>
+          <p:grpSpPr>
+            <a:xfrm>
+              <a:off x="2692342" y="2916985"/>
+              <a:ext cx="1656184" cy="1726735"/>
+              <a:chOff x="3824389" y="1958752"/>
+              <a:chExt cx="1656184" cy="1726735"/>
+            </a:xfrm>
+          </p:grpSpPr>
+          <p:sp>
+            <p:nvSpPr>
+              <p:cNvPr id="5" name="4 Rectángulo"/>
+              <p:cNvSpPr/>
+              <p:nvPr/>
+            </p:nvSpPr>
+            <p:spPr>
+              <a:xfrm>
+                <a:off x="3824389" y="1958752"/>
+                <a:ext cx="1656184" cy="576064"/>
+              </a:xfrm>
+              <a:prstGeom prst="rect">
+                <a:avLst/>
+              </a:prstGeom>
+            </p:spPr>
+            <p:style>
+              <a:lnRef idx="2">
+                <a:schemeClr val="accent1"/>
+              </a:lnRef>
+              <a:fillRef idx="1">
+                <a:schemeClr val="lt1"/>
+              </a:fillRef>
+              <a:effectRef idx="0">
+                <a:schemeClr val="accent1"/>
+              </a:effectRef>
+              <a:fontRef idx="minor">
+                <a:schemeClr val="dk1"/>
+              </a:fontRef>
+            </p:style>
+            <p:txBody>
+              <a:bodyPr rtlCol="0" anchor="ctr"/>
+              <a:lstStyle/>
+              <a:p>
+                <a:pPr algn="ctr"/>
+                <a:r>
+                  <a:rPr lang="es-ES" dirty="0" smtClean="0"/>
+                  <a:t>Venta</a:t>
+                </a:r>
+                <a:endParaRPr lang="es-ES" dirty="0"/>
+              </a:p>
+            </p:txBody>
+          </p:sp>
+          <p:sp>
+            <p:nvSpPr>
+              <p:cNvPr id="15" name="14 Rectángulo"/>
+              <p:cNvSpPr/>
+              <p:nvPr/>
+            </p:nvSpPr>
+            <p:spPr>
+              <a:xfrm>
+                <a:off x="3824389" y="2534816"/>
+                <a:ext cx="1651604" cy="1150671"/>
+              </a:xfrm>
+              <a:prstGeom prst="rect">
+                <a:avLst/>
+              </a:prstGeom>
+            </p:spPr>
+            <p:style>
+              <a:lnRef idx="2">
+                <a:schemeClr val="accent1"/>
+              </a:lnRef>
+              <a:fillRef idx="1">
+                <a:schemeClr val="lt1"/>
+              </a:fillRef>
+              <a:effectRef idx="0">
+                <a:schemeClr val="accent1"/>
+              </a:effectRef>
+              <a:fontRef idx="minor">
+                <a:schemeClr val="dk1"/>
+              </a:fontRef>
+            </p:style>
+            <p:txBody>
+              <a:bodyPr rtlCol="0" anchor="ctr"/>
+              <a:lstStyle/>
+              <a:p>
+                <a:pPr algn="ctr"/>
+                <a:r>
+                  <a:rPr lang="es-ES" dirty="0" smtClean="0"/>
+                  <a:t>No. </a:t>
+                </a:r>
+                <a:r>
+                  <a:rPr lang="es-ES" dirty="0"/>
+                  <a:t>d</a:t>
+                </a:r>
+                <a:r>
+                  <a:rPr lang="es-ES" dirty="0" smtClean="0"/>
+                  <a:t>e venta</a:t>
+                </a:r>
+              </a:p>
+              <a:p>
+                <a:pPr algn="ctr"/>
+                <a:r>
+                  <a:rPr lang="es-ES" dirty="0" smtClean="0"/>
+                  <a:t>Total</a:t>
+                </a:r>
+              </a:p>
+              <a:p>
+                <a:pPr algn="ctr"/>
+                <a:r>
+                  <a:rPr lang="es-ES" dirty="0" smtClean="0"/>
+                  <a:t>Fecha</a:t>
+                </a:r>
+              </a:p>
+              <a:p>
+                <a:pPr algn="ctr"/>
+                <a:endParaRPr lang="es-ES" dirty="0"/>
+              </a:p>
+            </p:txBody>
+          </p:sp>
+        </p:grpSp>
+        <p:grpSp>
+          <p:nvGrpSpPr>
+            <p:cNvPr id="18" name="17 Grupo"/>
+            <p:cNvGrpSpPr/>
+            <p:nvPr/>
+          </p:nvGrpSpPr>
+          <p:grpSpPr>
+            <a:xfrm>
+              <a:off x="2687761" y="5461120"/>
+              <a:ext cx="1649047" cy="1327689"/>
+              <a:chOff x="3831525" y="3758952"/>
+              <a:chExt cx="1649047" cy="1726735"/>
+            </a:xfrm>
+          </p:grpSpPr>
+          <p:sp>
+            <p:nvSpPr>
+              <p:cNvPr id="9" name="8 Rectángulo"/>
+              <p:cNvSpPr/>
+              <p:nvPr/>
+            </p:nvSpPr>
+            <p:spPr>
+              <a:xfrm>
+                <a:off x="3831525" y="3758952"/>
+                <a:ext cx="1649047" cy="576064"/>
+              </a:xfrm>
+              <a:prstGeom prst="rect">
+                <a:avLst/>
+              </a:prstGeom>
+            </p:spPr>
+            <p:style>
+              <a:lnRef idx="2">
+                <a:schemeClr val="accent1"/>
+              </a:lnRef>
+              <a:fillRef idx="1">
+                <a:schemeClr val="lt1"/>
+              </a:fillRef>
+              <a:effectRef idx="0">
+                <a:schemeClr val="accent1"/>
+              </a:effectRef>
+              <a:fontRef idx="minor">
+                <a:schemeClr val="dk1"/>
+              </a:fontRef>
+            </p:style>
+            <p:txBody>
+              <a:bodyPr rtlCol="0" anchor="ctr"/>
+              <a:lstStyle/>
+              <a:p>
+                <a:pPr algn="ctr"/>
+                <a:r>
+                  <a:rPr lang="es-ES" dirty="0" smtClean="0"/>
+                  <a:t>Pago</a:t>
+                </a:r>
+                <a:endParaRPr lang="es-ES" dirty="0"/>
+              </a:p>
+            </p:txBody>
+          </p:sp>
+          <p:sp>
+            <p:nvSpPr>
+              <p:cNvPr id="17" name="16 Rectángulo"/>
+              <p:cNvSpPr/>
+              <p:nvPr/>
+            </p:nvSpPr>
+            <p:spPr>
+              <a:xfrm>
+                <a:off x="3831526" y="4335015"/>
+                <a:ext cx="1649046" cy="1150672"/>
+              </a:xfrm>
+              <a:prstGeom prst="rect">
+                <a:avLst/>
+              </a:prstGeom>
+            </p:spPr>
+            <p:style>
+              <a:lnRef idx="2">
+                <a:schemeClr val="accent1"/>
+              </a:lnRef>
+              <a:fillRef idx="1">
+                <a:schemeClr val="lt1"/>
+              </a:fillRef>
+              <a:effectRef idx="0">
+                <a:schemeClr val="accent1"/>
+              </a:effectRef>
+              <a:fontRef idx="minor">
+                <a:schemeClr val="dk1"/>
+              </a:fontRef>
+            </p:style>
+            <p:txBody>
+              <a:bodyPr rtlCol="0" anchor="ctr"/>
+              <a:lstStyle/>
+              <a:p>
+                <a:pPr algn="ctr"/>
+                <a:r>
+                  <a:rPr lang="es-ES" dirty="0" smtClean="0"/>
+                  <a:t>Forma de pago</a:t>
+                </a:r>
+              </a:p>
+              <a:p>
+                <a:pPr algn="ctr"/>
+                <a:r>
+                  <a:rPr lang="es-ES" dirty="0" smtClean="0"/>
+                  <a:t>Monto</a:t>
+                </a:r>
+              </a:p>
+              <a:p>
+                <a:pPr algn="ctr"/>
+                <a:endParaRPr lang="es-ES" dirty="0" smtClean="0"/>
+              </a:p>
+            </p:txBody>
+          </p:sp>
+        </p:grpSp>
+        <p:grpSp>
+          <p:nvGrpSpPr>
+            <p:cNvPr id="22" name="21 Grupo"/>
+            <p:cNvGrpSpPr/>
+            <p:nvPr/>
+          </p:nvGrpSpPr>
+          <p:grpSpPr>
+            <a:xfrm>
+              <a:off x="7092280" y="2516028"/>
+              <a:ext cx="1790355" cy="2344612"/>
+              <a:chOff x="6888863" y="1958752"/>
+              <a:chExt cx="1656184" cy="1726735"/>
+            </a:xfrm>
+          </p:grpSpPr>
+          <p:sp>
+            <p:nvSpPr>
+              <p:cNvPr id="6" name="5 Rectángulo"/>
+              <p:cNvSpPr/>
+              <p:nvPr/>
+            </p:nvSpPr>
+            <p:spPr>
+              <a:xfrm>
+                <a:off x="6888863" y="1958752"/>
+                <a:ext cx="1656184" cy="576064"/>
+              </a:xfrm>
+              <a:prstGeom prst="rect">
+                <a:avLst/>
+              </a:prstGeom>
+            </p:spPr>
+            <p:style>
+              <a:lnRef idx="2">
+                <a:schemeClr val="accent1"/>
+              </a:lnRef>
+              <a:fillRef idx="1">
+                <a:schemeClr val="lt1"/>
+              </a:fillRef>
+              <a:effectRef idx="0">
+                <a:schemeClr val="accent1"/>
+              </a:effectRef>
+              <a:fontRef idx="minor">
+                <a:schemeClr val="dk1"/>
+              </a:fontRef>
+            </p:style>
+            <p:txBody>
+              <a:bodyPr rtlCol="0" anchor="ctr"/>
+              <a:lstStyle/>
+              <a:p>
+                <a:pPr algn="ctr"/>
+                <a:r>
+                  <a:rPr lang="es-ES" dirty="0" smtClean="0"/>
+                  <a:t>Cliente</a:t>
+                </a:r>
+                <a:endParaRPr lang="es-ES" dirty="0"/>
+              </a:p>
+            </p:txBody>
+          </p:sp>
+          <p:sp>
+            <p:nvSpPr>
+              <p:cNvPr id="21" name="20 Rectángulo"/>
+              <p:cNvSpPr/>
+              <p:nvPr/>
+            </p:nvSpPr>
+            <p:spPr>
+              <a:xfrm>
+                <a:off x="6888863" y="2534816"/>
+                <a:ext cx="1656184" cy="1150671"/>
+              </a:xfrm>
+              <a:prstGeom prst="rect">
+                <a:avLst/>
+              </a:prstGeom>
+            </p:spPr>
+            <p:style>
+              <a:lnRef idx="2">
+                <a:schemeClr val="accent1"/>
+              </a:lnRef>
+              <a:fillRef idx="1">
+                <a:schemeClr val="lt1"/>
+              </a:fillRef>
+              <a:effectRef idx="0">
+                <a:schemeClr val="accent1"/>
+              </a:effectRef>
+              <a:fontRef idx="minor">
+                <a:schemeClr val="dk1"/>
+              </a:fontRef>
+            </p:style>
+            <p:txBody>
+              <a:bodyPr rtlCol="0" anchor="ctr"/>
+              <a:lstStyle/>
+              <a:p>
+                <a:pPr algn="ctr"/>
+                <a:r>
+                  <a:rPr lang="es-ES" dirty="0" smtClean="0"/>
+                  <a:t>Nombre</a:t>
+                </a:r>
+              </a:p>
+              <a:p>
+                <a:pPr algn="ctr"/>
+                <a:r>
+                  <a:rPr lang="es-ES" dirty="0" smtClean="0"/>
+                  <a:t>Correo</a:t>
+                </a:r>
+              </a:p>
+              <a:p>
+                <a:pPr algn="ctr"/>
+                <a:r>
+                  <a:rPr lang="es-ES" dirty="0" smtClean="0"/>
+                  <a:t>Usuario</a:t>
+                </a:r>
+              </a:p>
+              <a:p>
+                <a:pPr algn="ctr"/>
+                <a:r>
+                  <a:rPr lang="es-ES" dirty="0" smtClean="0"/>
+                  <a:t>Domicilio</a:t>
+                </a:r>
+              </a:p>
+              <a:p>
+                <a:pPr algn="ctr"/>
+                <a:r>
+                  <a:rPr lang="es-ES" dirty="0" smtClean="0"/>
+                  <a:t>Teléfono</a:t>
+                </a:r>
+                <a:endParaRPr lang="es-ES" dirty="0"/>
+              </a:p>
+            </p:txBody>
+          </p:sp>
+        </p:grpSp>
+        <p:grpSp>
+          <p:nvGrpSpPr>
+            <p:cNvPr id="24" name="23 Grupo"/>
+            <p:cNvGrpSpPr/>
+            <p:nvPr/>
+          </p:nvGrpSpPr>
+          <p:grpSpPr>
+            <a:xfrm>
+              <a:off x="5007882" y="2916985"/>
+              <a:ext cx="1656184" cy="1726735"/>
+              <a:chOff x="5904148" y="-5533"/>
+              <a:chExt cx="1656184" cy="1726735"/>
+            </a:xfrm>
+          </p:grpSpPr>
+          <p:sp>
+            <p:nvSpPr>
+              <p:cNvPr id="10" name="9 Rectángulo"/>
+              <p:cNvSpPr/>
+              <p:nvPr/>
+            </p:nvSpPr>
+            <p:spPr>
+              <a:xfrm>
+                <a:off x="5904148" y="-5533"/>
+                <a:ext cx="1656184" cy="576064"/>
+              </a:xfrm>
+              <a:prstGeom prst="rect">
+                <a:avLst/>
+              </a:prstGeom>
+            </p:spPr>
+            <p:style>
+              <a:lnRef idx="2">
+                <a:schemeClr val="accent1"/>
+              </a:lnRef>
+              <a:fillRef idx="1">
+                <a:schemeClr val="lt1"/>
+              </a:fillRef>
+              <a:effectRef idx="0">
+                <a:schemeClr val="accent1"/>
+              </a:effectRef>
+              <a:fontRef idx="minor">
+                <a:schemeClr val="dk1"/>
+              </a:fontRef>
+            </p:style>
+            <p:txBody>
+              <a:bodyPr rtlCol="0" anchor="ctr"/>
+              <a:lstStyle/>
+              <a:p>
+                <a:pPr algn="ctr"/>
+                <a:r>
+                  <a:rPr lang="es-ES" dirty="0" smtClean="0"/>
+                  <a:t>Carrito</a:t>
+                </a:r>
+              </a:p>
+            </p:txBody>
+          </p:sp>
+          <p:sp>
+            <p:nvSpPr>
+              <p:cNvPr id="23" name="22 Rectángulo"/>
+              <p:cNvSpPr/>
+              <p:nvPr/>
+            </p:nvSpPr>
+            <p:spPr>
+              <a:xfrm>
+                <a:off x="5904148" y="570531"/>
+                <a:ext cx="1656184" cy="1150671"/>
+              </a:xfrm>
+              <a:prstGeom prst="rect">
+                <a:avLst/>
+              </a:prstGeom>
+            </p:spPr>
+            <p:style>
+              <a:lnRef idx="2">
+                <a:schemeClr val="accent1"/>
+              </a:lnRef>
+              <a:fillRef idx="1">
+                <a:schemeClr val="lt1"/>
+              </a:fillRef>
+              <a:effectRef idx="0">
+                <a:schemeClr val="accent1"/>
+              </a:effectRef>
+              <a:fontRef idx="minor">
+                <a:schemeClr val="dk1"/>
+              </a:fontRef>
+            </p:style>
+            <p:txBody>
+              <a:bodyPr rtlCol="0" anchor="ctr"/>
+              <a:lstStyle/>
+              <a:p>
+                <a:pPr algn="ctr"/>
+                <a:r>
+                  <a:rPr lang="es-ES" dirty="0" smtClean="0"/>
+                  <a:t>No. de artículos</a:t>
+                </a:r>
+                <a:endParaRPr lang="es-ES" dirty="0"/>
+              </a:p>
+            </p:txBody>
+          </p:sp>
+        </p:grpSp>
+        <p:grpSp>
+          <p:nvGrpSpPr>
+            <p:cNvPr id="26" name="25 Grupo"/>
+            <p:cNvGrpSpPr/>
+            <p:nvPr/>
+          </p:nvGrpSpPr>
+          <p:grpSpPr>
+            <a:xfrm>
+              <a:off x="2560935" y="715734"/>
+              <a:ext cx="1954088" cy="1628169"/>
+              <a:chOff x="1128223" y="1988452"/>
+              <a:chExt cx="1656184" cy="1151399"/>
+            </a:xfrm>
+          </p:grpSpPr>
+          <p:sp>
+            <p:nvSpPr>
+              <p:cNvPr id="27" name="26 Rectángulo"/>
+              <p:cNvSpPr/>
+              <p:nvPr/>
+            </p:nvSpPr>
+            <p:spPr>
+              <a:xfrm>
+                <a:off x="1128223" y="1988452"/>
+                <a:ext cx="1656184" cy="390880"/>
+              </a:xfrm>
+              <a:prstGeom prst="rect">
+                <a:avLst/>
+              </a:prstGeom>
+            </p:spPr>
+            <p:style>
+              <a:lnRef idx="2">
+                <a:schemeClr val="accent1"/>
+              </a:lnRef>
+              <a:fillRef idx="1">
+                <a:schemeClr val="lt1"/>
+              </a:fillRef>
+              <a:effectRef idx="0">
+                <a:schemeClr val="accent1"/>
+              </a:effectRef>
+              <a:fontRef idx="minor">
+                <a:schemeClr val="dk1"/>
+              </a:fontRef>
+            </p:style>
+            <p:txBody>
+              <a:bodyPr rtlCol="0" anchor="ctr"/>
+              <a:lstStyle/>
+              <a:p>
+                <a:pPr algn="ctr"/>
+                <a:r>
+                  <a:rPr lang="es-ES" dirty="0" smtClean="0"/>
+                  <a:t>Envío</a:t>
+                </a:r>
+                <a:endParaRPr lang="es-ES" dirty="0"/>
+              </a:p>
+            </p:txBody>
+          </p:sp>
+          <p:sp>
+            <p:nvSpPr>
+              <p:cNvPr id="28" name="27 Rectángulo"/>
+              <p:cNvSpPr/>
+              <p:nvPr/>
+            </p:nvSpPr>
+            <p:spPr>
+              <a:xfrm>
+                <a:off x="1128223" y="2379332"/>
+                <a:ext cx="1656184" cy="760519"/>
+              </a:xfrm>
+              <a:prstGeom prst="rect">
+                <a:avLst/>
+              </a:prstGeom>
+            </p:spPr>
+            <p:style>
+              <a:lnRef idx="2">
+                <a:schemeClr val="accent1"/>
+              </a:lnRef>
+              <a:fillRef idx="1">
+                <a:schemeClr val="lt1"/>
+              </a:fillRef>
+              <a:effectRef idx="0">
+                <a:schemeClr val="accent1"/>
+              </a:effectRef>
+              <a:fontRef idx="minor">
+                <a:schemeClr val="dk1"/>
+              </a:fontRef>
+            </p:style>
+            <p:txBody>
+              <a:bodyPr rtlCol="0" anchor="ctr"/>
+              <a:lstStyle/>
+              <a:p>
+                <a:pPr algn="ctr"/>
+                <a:r>
+                  <a:rPr lang="es-ES" dirty="0" smtClean="0"/>
+                  <a:t>Costo</a:t>
+                </a:r>
+              </a:p>
+              <a:p>
+                <a:pPr algn="ctr"/>
+                <a:r>
+                  <a:rPr lang="es-ES" dirty="0" smtClean="0"/>
+                  <a:t>Empresa</a:t>
+                </a:r>
+              </a:p>
+              <a:p>
+                <a:pPr algn="ctr"/>
+                <a:r>
+                  <a:rPr lang="es-ES" dirty="0" smtClean="0"/>
+                  <a:t>Dirección</a:t>
+                </a:r>
+              </a:p>
+            </p:txBody>
+          </p:sp>
+        </p:grpSp>
+        <p:cxnSp>
+          <p:nvCxnSpPr>
+            <p:cNvPr id="30" name="29 Conector recto"/>
+            <p:cNvCxnSpPr>
+              <a:stCxn id="12" idx="3"/>
+              <a:endCxn id="15" idx="1"/>
+            </p:cNvCxnSpPr>
+            <p:nvPr/>
+          </p:nvCxnSpPr>
           <p:spPr>
             <a:xfrm>
-              <a:off x="1128223" y="1988452"/>
-              <a:ext cx="1656184" cy="390880"/>
+              <a:off x="2023856" y="4061970"/>
+              <a:ext cx="668486" cy="6415"/>
             </a:xfrm>
-            <a:prstGeom prst="rect">
+            <a:prstGeom prst="line">
               <a:avLst/>
             </a:prstGeom>
           </p:spPr>
           <p:style>
-            <a:lnRef idx="2">
+            <a:lnRef idx="1">
               <a:schemeClr val="accent1"/>
             </a:lnRef>
-            <a:fillRef idx="1">
-              <a:schemeClr val="lt1"/>
+            <a:fillRef idx="0">
+              <a:schemeClr val="accent1"/>
             </a:fillRef>
             <a:effectRef idx="0">
               <a:schemeClr val="accent1"/>
             </a:effectRef>
             <a:fontRef idx="minor">
-              <a:schemeClr val="dk1"/>
+              <a:schemeClr val="tx1"/>
             </a:fontRef>
           </p:style>
+        </p:cxnSp>
+        <p:cxnSp>
+          <p:nvCxnSpPr>
+            <p:cNvPr id="32" name="31 Conector recto"/>
+            <p:cNvCxnSpPr>
+              <a:stCxn id="15" idx="3"/>
+              <a:endCxn id="23" idx="1"/>
+            </p:cNvCxnSpPr>
+            <p:nvPr/>
+          </p:nvCxnSpPr>
+          <p:spPr>
+            <a:xfrm>
+              <a:off x="4343946" y="4068385"/>
+              <a:ext cx="663936" cy="0"/>
+            </a:xfrm>
+            <a:prstGeom prst="line">
+              <a:avLst/>
+            </a:prstGeom>
+          </p:spPr>
+          <p:style>
+            <a:lnRef idx="1">
+              <a:schemeClr val="accent1"/>
+            </a:lnRef>
+            <a:fillRef idx="0">
+              <a:schemeClr val="accent1"/>
+            </a:fillRef>
+            <a:effectRef idx="0">
+              <a:schemeClr val="accent1"/>
+            </a:effectRef>
+            <a:fontRef idx="minor">
+              <a:schemeClr val="tx1"/>
+            </a:fontRef>
+          </p:style>
+        </p:cxnSp>
+        <p:cxnSp>
+          <p:nvCxnSpPr>
+            <p:cNvPr id="35" name="34 Conector recto"/>
+            <p:cNvCxnSpPr>
+              <a:stCxn id="23" idx="3"/>
+            </p:cNvCxnSpPr>
+            <p:nvPr/>
+          </p:nvCxnSpPr>
+          <p:spPr>
+            <a:xfrm flipV="1">
+              <a:off x="6664066" y="4061970"/>
+              <a:ext cx="424377" cy="6415"/>
+            </a:xfrm>
+            <a:prstGeom prst="line">
+              <a:avLst/>
+            </a:prstGeom>
+          </p:spPr>
+          <p:style>
+            <a:lnRef idx="1">
+              <a:schemeClr val="accent1"/>
+            </a:lnRef>
+            <a:fillRef idx="0">
+              <a:schemeClr val="accent1"/>
+            </a:fillRef>
+            <a:effectRef idx="0">
+              <a:schemeClr val="accent1"/>
+            </a:effectRef>
+            <a:fontRef idx="minor">
+              <a:schemeClr val="tx1"/>
+            </a:fontRef>
+          </p:style>
+        </p:cxnSp>
+        <p:cxnSp>
+          <p:nvCxnSpPr>
+            <p:cNvPr id="37" name="36 Conector recto"/>
+            <p:cNvCxnSpPr>
+              <a:stCxn id="9" idx="0"/>
+              <a:endCxn id="15" idx="2"/>
+            </p:cNvCxnSpPr>
+            <p:nvPr/>
+          </p:nvCxnSpPr>
+          <p:spPr>
+            <a:xfrm flipV="1">
+              <a:off x="3512285" y="4643720"/>
+              <a:ext cx="5859" cy="817400"/>
+            </a:xfrm>
+            <a:prstGeom prst="line">
+              <a:avLst/>
+            </a:prstGeom>
+          </p:spPr>
+          <p:style>
+            <a:lnRef idx="1">
+              <a:schemeClr val="accent1"/>
+            </a:lnRef>
+            <a:fillRef idx="0">
+              <a:schemeClr val="accent1"/>
+            </a:fillRef>
+            <a:effectRef idx="0">
+              <a:schemeClr val="accent1"/>
+            </a:effectRef>
+            <a:fontRef idx="minor">
+              <a:schemeClr val="tx1"/>
+            </a:fontRef>
+          </p:style>
+        </p:cxnSp>
+        <p:cxnSp>
+          <p:nvCxnSpPr>
+            <p:cNvPr id="39" name="38 Conector recto"/>
+            <p:cNvCxnSpPr>
+              <a:stCxn id="28" idx="2"/>
+              <a:endCxn id="5" idx="0"/>
+            </p:cNvCxnSpPr>
+            <p:nvPr/>
+          </p:nvCxnSpPr>
+          <p:spPr>
+            <a:xfrm flipH="1">
+              <a:off x="3520434" y="2343903"/>
+              <a:ext cx="17545" cy="573082"/>
+            </a:xfrm>
+            <a:prstGeom prst="line">
+              <a:avLst/>
+            </a:prstGeom>
+          </p:spPr>
+          <p:style>
+            <a:lnRef idx="1">
+              <a:schemeClr val="accent1"/>
+            </a:lnRef>
+            <a:fillRef idx="0">
+              <a:schemeClr val="accent1"/>
+            </a:fillRef>
+            <a:effectRef idx="0">
+              <a:schemeClr val="accent1"/>
+            </a:effectRef>
+            <a:fontRef idx="minor">
+              <a:schemeClr val="tx1"/>
+            </a:fontRef>
+          </p:style>
+        </p:cxnSp>
+        <p:sp>
+          <p:nvSpPr>
+            <p:cNvPr id="41" name="40 CuadroTexto"/>
+            <p:cNvSpPr txBox="1"/>
+            <p:nvPr/>
+          </p:nvSpPr>
+          <p:spPr>
+            <a:xfrm>
+              <a:off x="1948757" y="3720925"/>
+              <a:ext cx="1039067" cy="369332"/>
+            </a:xfrm>
+            <a:prstGeom prst="rect">
+              <a:avLst/>
+            </a:prstGeom>
+            <a:noFill/>
+          </p:spPr>
           <p:txBody>
-            <a:bodyPr rtlCol="0" anchor="ctr"/>
+            <a:bodyPr wrap="none" rtlCol="0">
+              <a:spAutoFit/>
+            </a:bodyPr>
             <a:lstStyle/>
             <a:p>
-              <a:pPr algn="ctr"/>
               <a:r>
                 <a:rPr lang="es-ES" dirty="0" smtClean="0"/>
-                <a:t>Producto</a:t>
+                <a:t>1..*   1..*</a:t>
               </a:r>
               <a:endParaRPr lang="es-ES" dirty="0"/>
             </a:p>
@@ -3153,123 +3999,29 @@
         </p:sp>
         <p:sp>
           <p:nvSpPr>
-            <p:cNvPr id="12" name="11 Rectángulo"/>
-            <p:cNvSpPr/>
+            <p:cNvPr id="42" name="41 CuadroTexto"/>
+            <p:cNvSpPr txBox="1"/>
             <p:nvPr/>
           </p:nvSpPr>
           <p:spPr>
             <a:xfrm>
-              <a:off x="1128223" y="2379332"/>
-              <a:ext cx="1656184" cy="760519"/>
+              <a:off x="6567777" y="3695845"/>
+              <a:ext cx="524503" cy="369332"/>
             </a:xfrm>
             <a:prstGeom prst="rect">
               <a:avLst/>
             </a:prstGeom>
+            <a:noFill/>
           </p:spPr>
-          <p:style>
-            <a:lnRef idx="2">
-              <a:schemeClr val="accent1"/>
-            </a:lnRef>
-            <a:fillRef idx="1">
-              <a:schemeClr val="lt1"/>
-            </a:fillRef>
-            <a:effectRef idx="0">
-              <a:schemeClr val="accent1"/>
-            </a:effectRef>
-            <a:fontRef idx="minor">
-              <a:schemeClr val="dk1"/>
-            </a:fontRef>
-          </p:style>
           <p:txBody>
-            <a:bodyPr rtlCol="0" anchor="ctr"/>
+            <a:bodyPr wrap="none" rtlCol="0">
+              <a:spAutoFit/>
+            </a:bodyPr>
             <a:lstStyle/>
             <a:p>
-              <a:pPr algn="ctr"/>
               <a:r>
                 <a:rPr lang="es-ES" dirty="0" smtClean="0"/>
-                <a:t>Código</a:t>
-              </a:r>
-            </a:p>
-            <a:p>
-              <a:pPr algn="ctr"/>
-              <a:r>
-                <a:rPr lang="es-ES" dirty="0" smtClean="0"/>
-                <a:t>Precio</a:t>
-              </a:r>
-            </a:p>
-            <a:p>
-              <a:pPr algn="ctr"/>
-              <a:r>
-                <a:rPr lang="es-ES" dirty="0" smtClean="0"/>
-                <a:t>Talla</a:t>
-              </a:r>
-            </a:p>
-            <a:p>
-              <a:pPr algn="ctr"/>
-              <a:r>
-                <a:rPr lang="es-ES" dirty="0" smtClean="0"/>
-                <a:t>Color</a:t>
-              </a:r>
-              <a:endParaRPr lang="es-ES" dirty="0"/>
-            </a:p>
-            <a:p>
-              <a:pPr algn="ctr"/>
-              <a:endParaRPr lang="es-ES" dirty="0" smtClean="0"/>
-            </a:p>
-          </p:txBody>
-        </p:sp>
-      </p:grpSp>
-      <p:grpSp>
-        <p:nvGrpSpPr>
-          <p:cNvPr id="16" name="15 Grupo"/>
-          <p:cNvGrpSpPr/>
-          <p:nvPr/>
-        </p:nvGrpSpPr>
-        <p:grpSpPr>
-          <a:xfrm>
-            <a:off x="2692342" y="2916985"/>
-            <a:ext cx="1656184" cy="1726735"/>
-            <a:chOff x="3824389" y="1958752"/>
-            <a:chExt cx="1656184" cy="1726735"/>
-          </a:xfrm>
-        </p:grpSpPr>
-        <p:sp>
-          <p:nvSpPr>
-            <p:cNvPr id="5" name="4 Rectángulo"/>
-            <p:cNvSpPr/>
-            <p:nvPr/>
-          </p:nvSpPr>
-          <p:spPr>
-            <a:xfrm>
-              <a:off x="3824389" y="1958752"/>
-              <a:ext cx="1656184" cy="576064"/>
-            </a:xfrm>
-            <a:prstGeom prst="rect">
-              <a:avLst/>
-            </a:prstGeom>
-          </p:spPr>
-          <p:style>
-            <a:lnRef idx="2">
-              <a:schemeClr val="accent1"/>
-            </a:lnRef>
-            <a:fillRef idx="1">
-              <a:schemeClr val="lt1"/>
-            </a:fillRef>
-            <a:effectRef idx="0">
-              <a:schemeClr val="accent1"/>
-            </a:effectRef>
-            <a:fontRef idx="minor">
-              <a:schemeClr val="dk1"/>
-            </a:fontRef>
-          </p:style>
-          <p:txBody>
-            <a:bodyPr rtlCol="0" anchor="ctr"/>
-            <a:lstStyle/>
-            <a:p>
-              <a:pPr algn="ctr"/>
-              <a:r>
-                <a:rPr lang="es-ES" dirty="0" smtClean="0"/>
-                <a:t>Venta</a:t>
+                <a:t>1  1</a:t>
               </a:r>
               <a:endParaRPr lang="es-ES" dirty="0"/>
             </a:p>
@@ -3277,123 +4029,29 @@
         </p:sp>
         <p:sp>
           <p:nvSpPr>
-            <p:cNvPr id="15" name="14 Rectángulo"/>
-            <p:cNvSpPr/>
+            <p:cNvPr id="43" name="42 CuadroTexto"/>
+            <p:cNvSpPr txBox="1"/>
             <p:nvPr/>
           </p:nvSpPr>
           <p:spPr>
             <a:xfrm>
-              <a:off x="3824389" y="2534816"/>
-              <a:ext cx="1651604" cy="1150671"/>
+              <a:off x="4298600" y="3692638"/>
+              <a:ext cx="755335" cy="369332"/>
             </a:xfrm>
             <a:prstGeom prst="rect">
               <a:avLst/>
             </a:prstGeom>
+            <a:noFill/>
           </p:spPr>
-          <p:style>
-            <a:lnRef idx="2">
-              <a:schemeClr val="accent1"/>
-            </a:lnRef>
-            <a:fillRef idx="1">
-              <a:schemeClr val="lt1"/>
-            </a:fillRef>
-            <a:effectRef idx="0">
-              <a:schemeClr val="accent1"/>
-            </a:effectRef>
-            <a:fontRef idx="minor">
-              <a:schemeClr val="dk1"/>
-            </a:fontRef>
-          </p:style>
           <p:txBody>
-            <a:bodyPr rtlCol="0" anchor="ctr"/>
+            <a:bodyPr wrap="none" rtlCol="0">
+              <a:spAutoFit/>
+            </a:bodyPr>
             <a:lstStyle/>
             <a:p>
-              <a:pPr algn="ctr"/>
               <a:r>
                 <a:rPr lang="es-ES" dirty="0" smtClean="0"/>
-                <a:t>No. </a:t>
-              </a:r>
-              <a:r>
-                <a:rPr lang="es-ES" dirty="0"/>
-                <a:t>d</a:t>
-              </a:r>
-              <a:r>
-                <a:rPr lang="es-ES" dirty="0" smtClean="0"/>
-                <a:t>e venta</a:t>
-              </a:r>
-            </a:p>
-            <a:p>
-              <a:pPr algn="ctr"/>
-              <a:r>
-                <a:rPr lang="es-ES" dirty="0" smtClean="0"/>
-                <a:t>Total</a:t>
-              </a:r>
-            </a:p>
-            <a:p>
-              <a:pPr algn="ctr"/>
-              <a:r>
-                <a:rPr lang="es-ES" dirty="0" smtClean="0"/>
-                <a:t>Fecha</a:t>
-              </a:r>
-            </a:p>
-            <a:p>
-              <a:pPr algn="ctr"/>
-              <a:endParaRPr lang="es-ES" dirty="0"/>
-            </a:p>
-          </p:txBody>
-        </p:sp>
-      </p:grpSp>
-      <p:grpSp>
-        <p:nvGrpSpPr>
-          <p:cNvPr id="18" name="17 Grupo"/>
-          <p:cNvGrpSpPr/>
-          <p:nvPr/>
-        </p:nvGrpSpPr>
-        <p:grpSpPr>
-          <a:xfrm>
-            <a:off x="2687761" y="5461120"/>
-            <a:ext cx="1649047" cy="1327689"/>
-            <a:chOff x="3831525" y="3758952"/>
-            <a:chExt cx="1649047" cy="1726735"/>
-          </a:xfrm>
-        </p:grpSpPr>
-        <p:sp>
-          <p:nvSpPr>
-            <p:cNvPr id="9" name="8 Rectángulo"/>
-            <p:cNvSpPr/>
-            <p:nvPr/>
-          </p:nvSpPr>
-          <p:spPr>
-            <a:xfrm>
-              <a:off x="3831525" y="3758952"/>
-              <a:ext cx="1649047" cy="576064"/>
-            </a:xfrm>
-            <a:prstGeom prst="rect">
-              <a:avLst/>
-            </a:prstGeom>
-          </p:spPr>
-          <p:style>
-            <a:lnRef idx="2">
-              <a:schemeClr val="accent1"/>
-            </a:lnRef>
-            <a:fillRef idx="1">
-              <a:schemeClr val="lt1"/>
-            </a:fillRef>
-            <a:effectRef idx="0">
-              <a:schemeClr val="accent1"/>
-            </a:effectRef>
-            <a:fontRef idx="minor">
-              <a:schemeClr val="dk1"/>
-            </a:fontRef>
-          </p:style>
-          <p:txBody>
-            <a:bodyPr rtlCol="0" anchor="ctr"/>
-            <a:lstStyle/>
-            <a:p>
-              <a:pPr algn="ctr"/>
-              <a:r>
-                <a:rPr lang="es-ES" dirty="0" smtClean="0"/>
-                <a:t>Pago</a:t>
+                <a:t>1..*  1</a:t>
               </a:r>
               <a:endParaRPr lang="es-ES" dirty="0"/>
             </a:p>
@@ -3401,108 +4059,38 @@
         </p:sp>
         <p:sp>
           <p:nvSpPr>
-            <p:cNvPr id="17" name="16 Rectángulo"/>
-            <p:cNvSpPr/>
+            <p:cNvPr id="45" name="44 CuadroTexto"/>
+            <p:cNvSpPr txBox="1"/>
             <p:nvPr/>
           </p:nvSpPr>
           <p:spPr>
             <a:xfrm>
-              <a:off x="3831526" y="4335015"/>
-              <a:ext cx="1649046" cy="1150672"/>
+              <a:off x="3114862" y="4590755"/>
+              <a:ext cx="576064" cy="923330"/>
             </a:xfrm>
             <a:prstGeom prst="rect">
               <a:avLst/>
             </a:prstGeom>
+            <a:noFill/>
           </p:spPr>
-          <p:style>
-            <a:lnRef idx="2">
-              <a:schemeClr val="accent1"/>
-            </a:lnRef>
-            <a:fillRef idx="1">
-              <a:schemeClr val="lt1"/>
-            </a:fillRef>
-            <a:effectRef idx="0">
-              <a:schemeClr val="accent1"/>
-            </a:effectRef>
-            <a:fontRef idx="minor">
-              <a:schemeClr val="dk1"/>
-            </a:fontRef>
-          </p:style>
           <p:txBody>
-            <a:bodyPr rtlCol="0" anchor="ctr"/>
+            <a:bodyPr wrap="square" rtlCol="0">
+              <a:spAutoFit/>
+            </a:bodyPr>
             <a:lstStyle/>
             <a:p>
-              <a:pPr algn="ctr"/>
               <a:r>
                 <a:rPr lang="es-ES" dirty="0" smtClean="0"/>
-                <a:t>Forma de pago</a:t>
+                <a:t>1</a:t>
               </a:r>
             </a:p>
             <a:p>
-              <a:pPr algn="ctr"/>
+              <a:endParaRPr lang="es-ES" dirty="0" smtClean="0"/>
+            </a:p>
+            <a:p>
               <a:r>
                 <a:rPr lang="es-ES" dirty="0" smtClean="0"/>
-                <a:t>Monto</a:t>
-              </a:r>
-            </a:p>
-            <a:p>
-              <a:pPr algn="ctr"/>
-              <a:endParaRPr lang="es-ES" dirty="0" smtClean="0"/>
-            </a:p>
-          </p:txBody>
-        </p:sp>
-      </p:grpSp>
-      <p:grpSp>
-        <p:nvGrpSpPr>
-          <p:cNvPr id="22" name="21 Grupo"/>
-          <p:cNvGrpSpPr/>
-          <p:nvPr/>
-        </p:nvGrpSpPr>
-        <p:grpSpPr>
-          <a:xfrm>
-            <a:off x="7092280" y="2516028"/>
-            <a:ext cx="1790355" cy="2344612"/>
-            <a:chOff x="6888863" y="1958752"/>
-            <a:chExt cx="1656184" cy="1726735"/>
-          </a:xfrm>
-        </p:grpSpPr>
-        <p:sp>
-          <p:nvSpPr>
-            <p:cNvPr id="6" name="5 Rectángulo"/>
-            <p:cNvSpPr/>
-            <p:nvPr/>
-          </p:nvSpPr>
-          <p:spPr>
-            <a:xfrm>
-              <a:off x="6888863" y="1958752"/>
-              <a:ext cx="1656184" cy="576064"/>
-            </a:xfrm>
-            <a:prstGeom prst="rect">
-              <a:avLst/>
-            </a:prstGeom>
-          </p:spPr>
-          <p:style>
-            <a:lnRef idx="2">
-              <a:schemeClr val="accent1"/>
-            </a:lnRef>
-            <a:fillRef idx="1">
-              <a:schemeClr val="lt1"/>
-            </a:fillRef>
-            <a:effectRef idx="0">
-              <a:schemeClr val="accent1"/>
-            </a:effectRef>
-            <a:fontRef idx="minor">
-              <a:schemeClr val="dk1"/>
-            </a:fontRef>
-          </p:style>
-          <p:txBody>
-            <a:bodyPr rtlCol="0" anchor="ctr"/>
-            <a:lstStyle/>
-            <a:p>
-              <a:pPr algn="ctr"/>
-              <a:r>
-                <a:rPr lang="es-ES" dirty="0" smtClean="0"/>
-                <a:t>Cliente</a:t>
+                <a:t>1</a:t>
               </a:r>
               <a:endParaRPr lang="es-ES" dirty="0"/>
             </a:p>
@@ -3510,224 +4098,371 @@
         </p:sp>
         <p:sp>
           <p:nvSpPr>
-            <p:cNvPr id="21" name="20 Rectángulo"/>
-            <p:cNvSpPr/>
+            <p:cNvPr id="46" name="45 CuadroTexto"/>
+            <p:cNvSpPr txBox="1"/>
             <p:nvPr/>
           </p:nvSpPr>
           <p:spPr>
             <a:xfrm>
-              <a:off x="6888863" y="2534816"/>
-              <a:ext cx="1656184" cy="1150671"/>
+              <a:off x="3252051" y="2260795"/>
+              <a:ext cx="301686" cy="646331"/>
             </a:xfrm>
             <a:prstGeom prst="rect">
               <a:avLst/>
             </a:prstGeom>
+            <a:noFill/>
+          </p:spPr>
+          <p:txBody>
+            <a:bodyPr wrap="none" rtlCol="0">
+              <a:spAutoFit/>
+            </a:bodyPr>
+            <a:lstStyle/>
+            <a:p>
+              <a:r>
+                <a:rPr lang="es-ES" dirty="0" smtClean="0"/>
+                <a:t>1</a:t>
+              </a:r>
+              <a:endParaRPr lang="es-ES" dirty="0"/>
+            </a:p>
+            <a:p>
+              <a:r>
+                <a:rPr lang="es-ES" dirty="0" smtClean="0"/>
+                <a:t>1</a:t>
+              </a:r>
+            </a:p>
+          </p:txBody>
+        </p:sp>
+        <p:grpSp>
+          <p:nvGrpSpPr>
+            <p:cNvPr id="47" name="46 Grupo"/>
+            <p:cNvGrpSpPr/>
+            <p:nvPr/>
+          </p:nvGrpSpPr>
+          <p:grpSpPr>
+            <a:xfrm>
+              <a:off x="203084" y="5760603"/>
+              <a:ext cx="1800200" cy="799553"/>
+              <a:chOff x="1128223" y="1988452"/>
+              <a:chExt cx="1656184" cy="1151399"/>
+            </a:xfrm>
+          </p:grpSpPr>
+          <p:sp>
+            <p:nvSpPr>
+              <p:cNvPr id="48" name="47 Rectángulo"/>
+              <p:cNvSpPr/>
+              <p:nvPr/>
+            </p:nvSpPr>
+            <p:spPr>
+              <a:xfrm>
+                <a:off x="1128223" y="1988452"/>
+                <a:ext cx="1656184" cy="390880"/>
+              </a:xfrm>
+              <a:prstGeom prst="rect">
+                <a:avLst/>
+              </a:prstGeom>
+            </p:spPr>
+            <p:style>
+              <a:lnRef idx="2">
+                <a:schemeClr val="accent1"/>
+              </a:lnRef>
+              <a:fillRef idx="1">
+                <a:schemeClr val="lt1"/>
+              </a:fillRef>
+              <a:effectRef idx="0">
+                <a:schemeClr val="accent1"/>
+              </a:effectRef>
+              <a:fontRef idx="minor">
+                <a:schemeClr val="dk1"/>
+              </a:fontRef>
+            </p:style>
+            <p:txBody>
+              <a:bodyPr rtlCol="0" anchor="ctr"/>
+              <a:lstStyle/>
+              <a:p>
+                <a:pPr algn="ctr"/>
+                <a:r>
+                  <a:rPr lang="es-ES" dirty="0" smtClean="0"/>
+                  <a:t>Categoría</a:t>
+                </a:r>
+                <a:endParaRPr lang="es-ES" dirty="0"/>
+              </a:p>
+            </p:txBody>
+          </p:sp>
+          <p:sp>
+            <p:nvSpPr>
+              <p:cNvPr id="49" name="48 Rectángulo"/>
+              <p:cNvSpPr/>
+              <p:nvPr/>
+            </p:nvSpPr>
+            <p:spPr>
+              <a:xfrm>
+                <a:off x="1128223" y="2379332"/>
+                <a:ext cx="1656184" cy="760519"/>
+              </a:xfrm>
+              <a:prstGeom prst="rect">
+                <a:avLst/>
+              </a:prstGeom>
+            </p:spPr>
+            <p:style>
+              <a:lnRef idx="2">
+                <a:schemeClr val="accent1"/>
+              </a:lnRef>
+              <a:fillRef idx="1">
+                <a:schemeClr val="lt1"/>
+              </a:fillRef>
+              <a:effectRef idx="0">
+                <a:schemeClr val="accent1"/>
+              </a:effectRef>
+              <a:fontRef idx="minor">
+                <a:schemeClr val="dk1"/>
+              </a:fontRef>
+            </p:style>
+            <p:txBody>
+              <a:bodyPr rtlCol="0" anchor="ctr"/>
+              <a:lstStyle/>
+              <a:p>
+                <a:pPr algn="ctr"/>
+                <a:r>
+                  <a:rPr lang="es-ES" dirty="0" smtClean="0"/>
+                  <a:t>Nombre</a:t>
+                </a:r>
+              </a:p>
+            </p:txBody>
+          </p:sp>
+        </p:grpSp>
+        <p:cxnSp>
+          <p:nvCxnSpPr>
+            <p:cNvPr id="50" name="49 Conector recto"/>
+            <p:cNvCxnSpPr>
+              <a:stCxn id="48" idx="0"/>
+              <a:endCxn id="12" idx="2"/>
+            </p:cNvCxnSpPr>
+            <p:nvPr/>
+          </p:nvCxnSpPr>
+          <p:spPr>
+            <a:xfrm flipV="1">
+              <a:off x="1103184" y="4750081"/>
+              <a:ext cx="20572" cy="1010522"/>
+            </a:xfrm>
+            <a:prstGeom prst="line">
+              <a:avLst/>
+            </a:prstGeom>
           </p:spPr>
           <p:style>
-            <a:lnRef idx="2">
+            <a:lnRef idx="1">
               <a:schemeClr val="accent1"/>
             </a:lnRef>
-            <a:fillRef idx="1">
-              <a:schemeClr val="lt1"/>
+            <a:fillRef idx="0">
+              <a:schemeClr val="accent1"/>
             </a:fillRef>
             <a:effectRef idx="0">
               <a:schemeClr val="accent1"/>
             </a:effectRef>
             <a:fontRef idx="minor">
-              <a:schemeClr val="dk1"/>
+              <a:schemeClr val="tx1"/>
             </a:fontRef>
           </p:style>
-          <p:txBody>
-            <a:bodyPr rtlCol="0" anchor="ctr"/>
-            <a:lstStyle/>
-            <a:p>
-              <a:pPr algn="ctr"/>
-              <a:r>
-                <a:rPr lang="es-ES" dirty="0" smtClean="0"/>
-                <a:t>Nombre</a:t>
-              </a:r>
-            </a:p>
-            <a:p>
-              <a:pPr algn="ctr"/>
-              <a:r>
-                <a:rPr lang="es-ES" dirty="0" smtClean="0"/>
-                <a:t>Correo</a:t>
-              </a:r>
-            </a:p>
-            <a:p>
-              <a:pPr algn="ctr"/>
-              <a:r>
-                <a:rPr lang="es-ES" dirty="0" smtClean="0"/>
-                <a:t>Usuario</a:t>
-              </a:r>
-            </a:p>
-            <a:p>
-              <a:pPr algn="ctr"/>
-              <a:r>
-                <a:rPr lang="es-ES" dirty="0" smtClean="0"/>
-                <a:t>Domicilio</a:t>
-              </a:r>
-            </a:p>
-            <a:p>
-              <a:pPr algn="ctr"/>
-              <a:r>
-                <a:rPr lang="es-ES" dirty="0" smtClean="0"/>
-                <a:t>Teléfono</a:t>
-              </a:r>
-              <a:endParaRPr lang="es-ES" dirty="0"/>
-            </a:p>
-          </p:txBody>
-        </p:sp>
-      </p:grpSp>
-      <p:grpSp>
-        <p:nvGrpSpPr>
-          <p:cNvPr id="24" name="23 Grupo"/>
-          <p:cNvGrpSpPr/>
-          <p:nvPr/>
-        </p:nvGrpSpPr>
-        <p:grpSpPr>
-          <a:xfrm>
-            <a:off x="5007882" y="2916985"/>
-            <a:ext cx="1656184" cy="1726735"/>
-            <a:chOff x="5904148" y="-5533"/>
-            <a:chExt cx="1656184" cy="1726735"/>
-          </a:xfrm>
-        </p:grpSpPr>
+        </p:cxnSp>
         <p:sp>
           <p:nvSpPr>
-            <p:cNvPr id="10" name="9 Rectángulo"/>
-            <p:cNvSpPr/>
+            <p:cNvPr id="51" name="50 CuadroTexto"/>
+            <p:cNvSpPr txBox="1"/>
             <p:nvPr/>
           </p:nvSpPr>
           <p:spPr>
             <a:xfrm>
-              <a:off x="5904148" y="-5533"/>
-              <a:ext cx="1656184" cy="576064"/>
+              <a:off x="1053348" y="4707623"/>
+              <a:ext cx="314296" cy="923330"/>
             </a:xfrm>
             <a:prstGeom prst="rect">
               <a:avLst/>
             </a:prstGeom>
+            <a:noFill/>
+          </p:spPr>
+          <p:txBody>
+            <a:bodyPr wrap="square" rtlCol="0">
+              <a:spAutoFit/>
+            </a:bodyPr>
+            <a:lstStyle/>
+            <a:p>
+              <a:r>
+                <a:rPr lang="es-ES" dirty="0" smtClean="0"/>
+                <a:t>1</a:t>
+              </a:r>
+            </a:p>
+            <a:p>
+              <a:endParaRPr lang="es-ES" dirty="0" smtClean="0"/>
+            </a:p>
+            <a:p>
+              <a:r>
+                <a:rPr lang="es-ES" dirty="0"/>
+                <a:t>1</a:t>
+              </a:r>
+            </a:p>
+          </p:txBody>
+        </p:sp>
+        <p:grpSp>
+          <p:nvGrpSpPr>
+            <p:cNvPr id="54" name="53 Grupo"/>
+            <p:cNvGrpSpPr/>
+            <p:nvPr/>
+          </p:nvGrpSpPr>
+          <p:grpSpPr>
+            <a:xfrm>
+              <a:off x="4863866" y="5309915"/>
+              <a:ext cx="1800200" cy="1507738"/>
+              <a:chOff x="1128223" y="1988452"/>
+              <a:chExt cx="1656184" cy="731956"/>
+            </a:xfrm>
+          </p:grpSpPr>
+          <p:sp>
+            <p:nvSpPr>
+              <p:cNvPr id="55" name="54 Rectángulo"/>
+              <p:cNvSpPr/>
+              <p:nvPr/>
+            </p:nvSpPr>
+            <p:spPr>
+              <a:xfrm>
+                <a:off x="1128223" y="1988452"/>
+                <a:ext cx="1656184" cy="390880"/>
+              </a:xfrm>
+              <a:prstGeom prst="rect">
+                <a:avLst/>
+              </a:prstGeom>
+            </p:spPr>
+            <p:style>
+              <a:lnRef idx="2">
+                <a:schemeClr val="accent1"/>
+              </a:lnRef>
+              <a:fillRef idx="1">
+                <a:schemeClr val="lt1"/>
+              </a:fillRef>
+              <a:effectRef idx="0">
+                <a:schemeClr val="accent1"/>
+              </a:effectRef>
+              <a:fontRef idx="minor">
+                <a:schemeClr val="dk1"/>
+              </a:fontRef>
+            </p:style>
+            <p:txBody>
+              <a:bodyPr rtlCol="0" anchor="ctr"/>
+              <a:lstStyle/>
+              <a:p>
+                <a:pPr algn="ctr"/>
+                <a:r>
+                  <a:rPr lang="es-ES" dirty="0" smtClean="0"/>
+                  <a:t>Inventario</a:t>
+                </a:r>
+                <a:endParaRPr lang="es-ES" dirty="0"/>
+              </a:p>
+            </p:txBody>
+          </p:sp>
+          <p:sp>
+            <p:nvSpPr>
+              <p:cNvPr id="56" name="55 Rectángulo"/>
+              <p:cNvSpPr/>
+              <p:nvPr/>
+            </p:nvSpPr>
+            <p:spPr>
+              <a:xfrm>
+                <a:off x="1128223" y="2294378"/>
+                <a:ext cx="1656184" cy="426030"/>
+              </a:xfrm>
+              <a:prstGeom prst="rect">
+                <a:avLst/>
+              </a:prstGeom>
+            </p:spPr>
+            <p:style>
+              <a:lnRef idx="2">
+                <a:schemeClr val="accent1"/>
+              </a:lnRef>
+              <a:fillRef idx="1">
+                <a:schemeClr val="lt1"/>
+              </a:fillRef>
+              <a:effectRef idx="0">
+                <a:schemeClr val="accent1"/>
+              </a:effectRef>
+              <a:fontRef idx="minor">
+                <a:schemeClr val="dk1"/>
+              </a:fontRef>
+            </p:style>
+            <p:txBody>
+              <a:bodyPr rtlCol="0" anchor="ctr"/>
+              <a:lstStyle/>
+              <a:p>
+                <a:pPr algn="ctr"/>
+                <a:r>
+                  <a:rPr lang="es-ES" dirty="0" smtClean="0"/>
+                  <a:t>Fecha</a:t>
+                </a:r>
+              </a:p>
+              <a:p>
+                <a:pPr algn="ctr"/>
+                <a:r>
+                  <a:rPr lang="es-ES" dirty="0" smtClean="0"/>
+                  <a:t>Hora</a:t>
+                </a:r>
+              </a:p>
+            </p:txBody>
+          </p:sp>
+        </p:grpSp>
+        <p:cxnSp>
+          <p:nvCxnSpPr>
+            <p:cNvPr id="58" name="57 Conector recto"/>
+            <p:cNvCxnSpPr>
+              <a:endCxn id="55" idx="0"/>
+            </p:cNvCxnSpPr>
+            <p:nvPr/>
+          </p:nvCxnSpPr>
+          <p:spPr>
+            <a:xfrm>
+              <a:off x="4348526" y="4643720"/>
+              <a:ext cx="1415440" cy="666195"/>
+            </a:xfrm>
+            <a:prstGeom prst="line">
+              <a:avLst/>
+            </a:prstGeom>
           </p:spPr>
           <p:style>
-            <a:lnRef idx="2">
+            <a:lnRef idx="1">
               <a:schemeClr val="accent1"/>
             </a:lnRef>
-            <a:fillRef idx="1">
-              <a:schemeClr val="lt1"/>
+            <a:fillRef idx="0">
+              <a:schemeClr val="accent1"/>
             </a:fillRef>
             <a:effectRef idx="0">
               <a:schemeClr val="accent1"/>
             </a:effectRef>
             <a:fontRef idx="minor">
-              <a:schemeClr val="dk1"/>
+              <a:schemeClr val="tx1"/>
             </a:fontRef>
           </p:style>
-          <p:txBody>
-            <a:bodyPr rtlCol="0" anchor="ctr"/>
-            <a:lstStyle/>
-            <a:p>
-              <a:pPr algn="ctr"/>
-              <a:r>
-                <a:rPr lang="es-ES" dirty="0" smtClean="0"/>
-                <a:t>Carrito</a:t>
-              </a:r>
-            </a:p>
-          </p:txBody>
-        </p:sp>
+        </p:cxnSp>
         <p:sp>
           <p:nvSpPr>
-            <p:cNvPr id="23" name="22 Rectángulo"/>
-            <p:cNvSpPr/>
+            <p:cNvPr id="59" name="58 CuadroTexto"/>
+            <p:cNvSpPr txBox="1"/>
             <p:nvPr/>
           </p:nvSpPr>
           <p:spPr>
             <a:xfrm>
-              <a:off x="5904148" y="570531"/>
-              <a:ext cx="1656184" cy="1150671"/>
+              <a:off x="5763966" y="4984622"/>
+              <a:ext cx="301686" cy="369332"/>
             </a:xfrm>
             <a:prstGeom prst="rect">
               <a:avLst/>
             </a:prstGeom>
+            <a:noFill/>
           </p:spPr>
-          <p:style>
-            <a:lnRef idx="2">
-              <a:schemeClr val="accent1"/>
-            </a:lnRef>
-            <a:fillRef idx="1">
-              <a:schemeClr val="lt1"/>
-            </a:fillRef>
-            <a:effectRef idx="0">
-              <a:schemeClr val="accent1"/>
-            </a:effectRef>
-            <a:fontRef idx="minor">
-              <a:schemeClr val="dk1"/>
-            </a:fontRef>
-          </p:style>
           <p:txBody>
-            <a:bodyPr rtlCol="0" anchor="ctr"/>
+            <a:bodyPr wrap="none" rtlCol="0">
+              <a:spAutoFit/>
+            </a:bodyPr>
             <a:lstStyle/>
             <a:p>
-              <a:pPr algn="ctr"/>
               <a:r>
                 <a:rPr lang="es-ES" dirty="0" smtClean="0"/>
-                <a:t>No. de artículos</a:t>
-              </a:r>
-              <a:endParaRPr lang="es-ES" dirty="0"/>
-            </a:p>
-          </p:txBody>
-        </p:sp>
-      </p:grpSp>
-      <p:grpSp>
-        <p:nvGrpSpPr>
-          <p:cNvPr id="26" name="25 Grupo"/>
-          <p:cNvGrpSpPr/>
-          <p:nvPr/>
-        </p:nvGrpSpPr>
-        <p:grpSpPr>
-          <a:xfrm>
-            <a:off x="2560935" y="715734"/>
-            <a:ext cx="1954088" cy="1628169"/>
-            <a:chOff x="1128223" y="1988452"/>
-            <a:chExt cx="1656184" cy="1151399"/>
-          </a:xfrm>
-        </p:grpSpPr>
-        <p:sp>
-          <p:nvSpPr>
-            <p:cNvPr id="27" name="26 Rectángulo"/>
-            <p:cNvSpPr/>
-            <p:nvPr/>
-          </p:nvSpPr>
-          <p:spPr>
-            <a:xfrm>
-              <a:off x="1128223" y="1988452"/>
-              <a:ext cx="1656184" cy="390880"/>
-            </a:xfrm>
-            <a:prstGeom prst="rect">
-              <a:avLst/>
-            </a:prstGeom>
-          </p:spPr>
-          <p:style>
-            <a:lnRef idx="2">
-              <a:schemeClr val="accent1"/>
-            </a:lnRef>
-            <a:fillRef idx="1">
-              <a:schemeClr val="lt1"/>
-            </a:fillRef>
-            <a:effectRef idx="0">
-              <a:schemeClr val="accent1"/>
-            </a:effectRef>
-            <a:fontRef idx="minor">
-              <a:schemeClr val="dk1"/>
-            </a:fontRef>
-          </p:style>
-          <p:txBody>
-            <a:bodyPr rtlCol="0" anchor="ctr"/>
-            <a:lstStyle/>
-            <a:p>
-              <a:pPr algn="ctr"/>
-              <a:r>
-                <a:rPr lang="es-ES" dirty="0" smtClean="0"/>
-                <a:t>Envío</a:t>
+                <a:t>1</a:t>
               </a:r>
               <a:endParaRPr lang="es-ES" dirty="0"/>
             </a:p>
@@ -3735,440 +4470,29 @@
         </p:sp>
         <p:sp>
           <p:nvSpPr>
-            <p:cNvPr id="28" name="27 Rectángulo"/>
-            <p:cNvSpPr/>
+            <p:cNvPr id="63" name="62 CuadroTexto"/>
+            <p:cNvSpPr txBox="1"/>
             <p:nvPr/>
           </p:nvSpPr>
           <p:spPr>
             <a:xfrm>
-              <a:off x="1128223" y="2379332"/>
-              <a:ext cx="1656184" cy="760519"/>
+              <a:off x="4314084" y="4380749"/>
+              <a:ext cx="532518" cy="369332"/>
             </a:xfrm>
             <a:prstGeom prst="rect">
               <a:avLst/>
             </a:prstGeom>
+            <a:noFill/>
           </p:spPr>
-          <p:style>
-            <a:lnRef idx="2">
-              <a:schemeClr val="accent1"/>
-            </a:lnRef>
-            <a:fillRef idx="1">
-              <a:schemeClr val="lt1"/>
-            </a:fillRef>
-            <a:effectRef idx="0">
-              <a:schemeClr val="accent1"/>
-            </a:effectRef>
-            <a:fontRef idx="minor">
-              <a:schemeClr val="dk1"/>
-            </a:fontRef>
-          </p:style>
           <p:txBody>
-            <a:bodyPr rtlCol="0" anchor="ctr"/>
+            <a:bodyPr wrap="none" rtlCol="0">
+              <a:spAutoFit/>
+            </a:bodyPr>
             <a:lstStyle/>
             <a:p>
-              <a:pPr algn="ctr"/>
               <a:r>
                 <a:rPr lang="es-ES" dirty="0" smtClean="0"/>
-                <a:t>Costo</a:t>
-              </a:r>
-            </a:p>
-            <a:p>
-              <a:pPr algn="ctr"/>
-              <a:r>
-                <a:rPr lang="es-ES" dirty="0" smtClean="0"/>
-                <a:t>Empresa</a:t>
-              </a:r>
-            </a:p>
-            <a:p>
-              <a:pPr algn="ctr"/>
-              <a:r>
-                <a:rPr lang="es-ES" dirty="0" smtClean="0"/>
-                <a:t>Dirección</a:t>
-              </a:r>
-            </a:p>
-          </p:txBody>
-        </p:sp>
-      </p:grpSp>
-      <p:cxnSp>
-        <p:nvCxnSpPr>
-          <p:cNvPr id="30" name="29 Conector recto"/>
-          <p:cNvCxnSpPr>
-            <a:stCxn id="12" idx="3"/>
-            <a:endCxn id="15" idx="1"/>
-          </p:cNvCxnSpPr>
-          <p:nvPr/>
-        </p:nvCxnSpPr>
-        <p:spPr>
-          <a:xfrm>
-            <a:off x="2023856" y="4061970"/>
-            <a:ext cx="668486" cy="6415"/>
-          </a:xfrm>
-          <a:prstGeom prst="line">
-            <a:avLst/>
-          </a:prstGeom>
-        </p:spPr>
-        <p:style>
-          <a:lnRef idx="1">
-            <a:schemeClr val="accent1"/>
-          </a:lnRef>
-          <a:fillRef idx="0">
-            <a:schemeClr val="accent1"/>
-          </a:fillRef>
-          <a:effectRef idx="0">
-            <a:schemeClr val="accent1"/>
-          </a:effectRef>
-          <a:fontRef idx="minor">
-            <a:schemeClr val="tx1"/>
-          </a:fontRef>
-        </p:style>
-      </p:cxnSp>
-      <p:cxnSp>
-        <p:nvCxnSpPr>
-          <p:cNvPr id="32" name="31 Conector recto"/>
-          <p:cNvCxnSpPr>
-            <a:stCxn id="15" idx="3"/>
-            <a:endCxn id="23" idx="1"/>
-          </p:cNvCxnSpPr>
-          <p:nvPr/>
-        </p:nvCxnSpPr>
-        <p:spPr>
-          <a:xfrm>
-            <a:off x="4343946" y="4068385"/>
-            <a:ext cx="663936" cy="0"/>
-          </a:xfrm>
-          <a:prstGeom prst="line">
-            <a:avLst/>
-          </a:prstGeom>
-        </p:spPr>
-        <p:style>
-          <a:lnRef idx="1">
-            <a:schemeClr val="accent1"/>
-          </a:lnRef>
-          <a:fillRef idx="0">
-            <a:schemeClr val="accent1"/>
-          </a:fillRef>
-          <a:effectRef idx="0">
-            <a:schemeClr val="accent1"/>
-          </a:effectRef>
-          <a:fontRef idx="minor">
-            <a:schemeClr val="tx1"/>
-          </a:fontRef>
-        </p:style>
-      </p:cxnSp>
-      <p:cxnSp>
-        <p:nvCxnSpPr>
-          <p:cNvPr id="35" name="34 Conector recto"/>
-          <p:cNvCxnSpPr>
-            <a:stCxn id="23" idx="3"/>
-          </p:cNvCxnSpPr>
-          <p:nvPr/>
-        </p:nvCxnSpPr>
-        <p:spPr>
-          <a:xfrm flipV="1">
-            <a:off x="6664066" y="4061970"/>
-            <a:ext cx="424377" cy="6415"/>
-          </a:xfrm>
-          <a:prstGeom prst="line">
-            <a:avLst/>
-          </a:prstGeom>
-        </p:spPr>
-        <p:style>
-          <a:lnRef idx="1">
-            <a:schemeClr val="accent1"/>
-          </a:lnRef>
-          <a:fillRef idx="0">
-            <a:schemeClr val="accent1"/>
-          </a:fillRef>
-          <a:effectRef idx="0">
-            <a:schemeClr val="accent1"/>
-          </a:effectRef>
-          <a:fontRef idx="minor">
-            <a:schemeClr val="tx1"/>
-          </a:fontRef>
-        </p:style>
-      </p:cxnSp>
-      <p:cxnSp>
-        <p:nvCxnSpPr>
-          <p:cNvPr id="37" name="36 Conector recto"/>
-          <p:cNvCxnSpPr>
-            <a:stCxn id="9" idx="0"/>
-            <a:endCxn id="15" idx="2"/>
-          </p:cNvCxnSpPr>
-          <p:nvPr/>
-        </p:nvCxnSpPr>
-        <p:spPr>
-          <a:xfrm flipV="1">
-            <a:off x="3512285" y="4643720"/>
-            <a:ext cx="5859" cy="817400"/>
-          </a:xfrm>
-          <a:prstGeom prst="line">
-            <a:avLst/>
-          </a:prstGeom>
-        </p:spPr>
-        <p:style>
-          <a:lnRef idx="1">
-            <a:schemeClr val="accent1"/>
-          </a:lnRef>
-          <a:fillRef idx="0">
-            <a:schemeClr val="accent1"/>
-          </a:fillRef>
-          <a:effectRef idx="0">
-            <a:schemeClr val="accent1"/>
-          </a:effectRef>
-          <a:fontRef idx="minor">
-            <a:schemeClr val="tx1"/>
-          </a:fontRef>
-        </p:style>
-      </p:cxnSp>
-      <p:cxnSp>
-        <p:nvCxnSpPr>
-          <p:cNvPr id="39" name="38 Conector recto"/>
-          <p:cNvCxnSpPr>
-            <a:stCxn id="28" idx="2"/>
-            <a:endCxn id="5" idx="0"/>
-          </p:cNvCxnSpPr>
-          <p:nvPr/>
-        </p:nvCxnSpPr>
-        <p:spPr>
-          <a:xfrm flipH="1">
-            <a:off x="3520434" y="2343903"/>
-            <a:ext cx="17545" cy="573082"/>
-          </a:xfrm>
-          <a:prstGeom prst="line">
-            <a:avLst/>
-          </a:prstGeom>
-        </p:spPr>
-        <p:style>
-          <a:lnRef idx="1">
-            <a:schemeClr val="accent1"/>
-          </a:lnRef>
-          <a:fillRef idx="0">
-            <a:schemeClr val="accent1"/>
-          </a:fillRef>
-          <a:effectRef idx="0">
-            <a:schemeClr val="accent1"/>
-          </a:effectRef>
-          <a:fontRef idx="minor">
-            <a:schemeClr val="tx1"/>
-          </a:fontRef>
-        </p:style>
-      </p:cxnSp>
-      <p:sp>
-        <p:nvSpPr>
-          <p:cNvPr id="41" name="40 CuadroTexto"/>
-          <p:cNvSpPr txBox="1"/>
-          <p:nvPr/>
-        </p:nvSpPr>
-        <p:spPr>
-          <a:xfrm>
-            <a:off x="1948757" y="3720925"/>
-            <a:ext cx="1039067" cy="369332"/>
-          </a:xfrm>
-          <a:prstGeom prst="rect">
-            <a:avLst/>
-          </a:prstGeom>
-          <a:noFill/>
-        </p:spPr>
-        <p:txBody>
-          <a:bodyPr wrap="none" rtlCol="0">
-            <a:spAutoFit/>
-          </a:bodyPr>
-          <a:lstStyle/>
-          <a:p>
-            <a:r>
-              <a:rPr lang="es-ES" dirty="0" smtClean="0"/>
-              <a:t>1..*   1..*</a:t>
-            </a:r>
-            <a:endParaRPr lang="es-ES" dirty="0"/>
-          </a:p>
-        </p:txBody>
-      </p:sp>
-      <p:sp>
-        <p:nvSpPr>
-          <p:cNvPr id="42" name="41 CuadroTexto"/>
-          <p:cNvSpPr txBox="1"/>
-          <p:nvPr/>
-        </p:nvSpPr>
-        <p:spPr>
-          <a:xfrm>
-            <a:off x="6567777" y="3695845"/>
-            <a:ext cx="524503" cy="369332"/>
-          </a:xfrm>
-          <a:prstGeom prst="rect">
-            <a:avLst/>
-          </a:prstGeom>
-          <a:noFill/>
-        </p:spPr>
-        <p:txBody>
-          <a:bodyPr wrap="none" rtlCol="0">
-            <a:spAutoFit/>
-          </a:bodyPr>
-          <a:lstStyle/>
-          <a:p>
-            <a:r>
-              <a:rPr lang="es-ES" dirty="0" smtClean="0"/>
-              <a:t>1  1</a:t>
-            </a:r>
-            <a:endParaRPr lang="es-ES" dirty="0"/>
-          </a:p>
-        </p:txBody>
-      </p:sp>
-      <p:sp>
-        <p:nvSpPr>
-          <p:cNvPr id="43" name="42 CuadroTexto"/>
-          <p:cNvSpPr txBox="1"/>
-          <p:nvPr/>
-        </p:nvSpPr>
-        <p:spPr>
-          <a:xfrm>
-            <a:off x="4298600" y="3692638"/>
-            <a:ext cx="755335" cy="369332"/>
-          </a:xfrm>
-          <a:prstGeom prst="rect">
-            <a:avLst/>
-          </a:prstGeom>
-          <a:noFill/>
-        </p:spPr>
-        <p:txBody>
-          <a:bodyPr wrap="none" rtlCol="0">
-            <a:spAutoFit/>
-          </a:bodyPr>
-          <a:lstStyle/>
-          <a:p>
-            <a:r>
-              <a:rPr lang="es-ES" dirty="0" smtClean="0"/>
-              <a:t>1..*  1</a:t>
-            </a:r>
-            <a:endParaRPr lang="es-ES" dirty="0"/>
-          </a:p>
-        </p:txBody>
-      </p:sp>
-      <p:sp>
-        <p:nvSpPr>
-          <p:cNvPr id="45" name="44 CuadroTexto"/>
-          <p:cNvSpPr txBox="1"/>
-          <p:nvPr/>
-        </p:nvSpPr>
-        <p:spPr>
-          <a:xfrm>
-            <a:off x="3114862" y="4590755"/>
-            <a:ext cx="576064" cy="923330"/>
-          </a:xfrm>
-          <a:prstGeom prst="rect">
-            <a:avLst/>
-          </a:prstGeom>
-          <a:noFill/>
-        </p:spPr>
-        <p:txBody>
-          <a:bodyPr wrap="square" rtlCol="0">
-            <a:spAutoFit/>
-          </a:bodyPr>
-          <a:lstStyle/>
-          <a:p>
-            <a:r>
-              <a:rPr lang="es-ES" dirty="0" smtClean="0"/>
-              <a:t>1</a:t>
-            </a:r>
-          </a:p>
-          <a:p>
-            <a:endParaRPr lang="es-ES" dirty="0" smtClean="0"/>
-          </a:p>
-          <a:p>
-            <a:r>
-              <a:rPr lang="es-ES" dirty="0" smtClean="0"/>
-              <a:t>1</a:t>
-            </a:r>
-            <a:endParaRPr lang="es-ES" dirty="0"/>
-          </a:p>
-        </p:txBody>
-      </p:sp>
-      <p:sp>
-        <p:nvSpPr>
-          <p:cNvPr id="46" name="45 CuadroTexto"/>
-          <p:cNvSpPr txBox="1"/>
-          <p:nvPr/>
-        </p:nvSpPr>
-        <p:spPr>
-          <a:xfrm>
-            <a:off x="3252051" y="2260795"/>
-            <a:ext cx="301686" cy="646331"/>
-          </a:xfrm>
-          <a:prstGeom prst="rect">
-            <a:avLst/>
-          </a:prstGeom>
-          <a:noFill/>
-        </p:spPr>
-        <p:txBody>
-          <a:bodyPr wrap="none" rtlCol="0">
-            <a:spAutoFit/>
-          </a:bodyPr>
-          <a:lstStyle/>
-          <a:p>
-            <a:r>
-              <a:rPr lang="es-ES" dirty="0" smtClean="0"/>
-              <a:t>1</a:t>
-            </a:r>
-            <a:endParaRPr lang="es-ES" dirty="0"/>
-          </a:p>
-          <a:p>
-            <a:r>
-              <a:rPr lang="es-ES" dirty="0" smtClean="0"/>
-              <a:t>1</a:t>
-            </a:r>
-          </a:p>
-        </p:txBody>
-      </p:sp>
-      <p:grpSp>
-        <p:nvGrpSpPr>
-          <p:cNvPr id="47" name="46 Grupo"/>
-          <p:cNvGrpSpPr/>
-          <p:nvPr/>
-        </p:nvGrpSpPr>
-        <p:grpSpPr>
-          <a:xfrm>
-            <a:off x="203084" y="5760603"/>
-            <a:ext cx="1800200" cy="799553"/>
-            <a:chOff x="1128223" y="1988452"/>
-            <a:chExt cx="1656184" cy="1151399"/>
-          </a:xfrm>
-        </p:grpSpPr>
-        <p:sp>
-          <p:nvSpPr>
-            <p:cNvPr id="48" name="47 Rectángulo"/>
-            <p:cNvSpPr/>
-            <p:nvPr/>
-          </p:nvSpPr>
-          <p:spPr>
-            <a:xfrm>
-              <a:off x="1128223" y="1988452"/>
-              <a:ext cx="1656184" cy="390880"/>
-            </a:xfrm>
-            <a:prstGeom prst="rect">
-              <a:avLst/>
-            </a:prstGeom>
-          </p:spPr>
-          <p:style>
-            <a:lnRef idx="2">
-              <a:schemeClr val="accent1"/>
-            </a:lnRef>
-            <a:fillRef idx="1">
-              <a:schemeClr val="lt1"/>
-            </a:fillRef>
-            <a:effectRef idx="0">
-              <a:schemeClr val="accent1"/>
-            </a:effectRef>
-            <a:fontRef idx="minor">
-              <a:schemeClr val="dk1"/>
-            </a:fontRef>
-          </p:style>
-          <p:txBody>
-            <a:bodyPr rtlCol="0" anchor="ctr"/>
-            <a:lstStyle/>
-            <a:p>
-              <a:pPr algn="ctr"/>
-              <a:r>
-                <a:rPr lang="es-ES" dirty="0" smtClean="0"/>
-                <a:t>Categoría</a:t>
+                <a:t>1..*</a:t>
               </a:r>
               <a:endParaRPr lang="es-ES" dirty="0"/>
             </a:p>
@@ -4176,344 +4500,35 @@
         </p:sp>
         <p:sp>
           <p:nvSpPr>
-            <p:cNvPr id="49" name="48 Rectángulo"/>
-            <p:cNvSpPr/>
+            <p:cNvPr id="2" name="1 CuadroTexto"/>
+            <p:cNvSpPr txBox="1"/>
             <p:nvPr/>
           </p:nvSpPr>
           <p:spPr>
             <a:xfrm>
-              <a:off x="1128223" y="2379332"/>
-              <a:ext cx="1656184" cy="760519"/>
+              <a:off x="3252051" y="188640"/>
+              <a:ext cx="2356479" cy="369332"/>
             </a:xfrm>
             <a:prstGeom prst="rect">
               <a:avLst/>
             </a:prstGeom>
+            <a:noFill/>
           </p:spPr>
-          <p:style>
-            <a:lnRef idx="2">
-              <a:schemeClr val="accent1"/>
-            </a:lnRef>
-            <a:fillRef idx="1">
-              <a:schemeClr val="lt1"/>
-            </a:fillRef>
-            <a:effectRef idx="0">
-              <a:schemeClr val="accent1"/>
-            </a:effectRef>
-            <a:fontRef idx="minor">
-              <a:schemeClr val="dk1"/>
-            </a:fontRef>
-          </p:style>
           <p:txBody>
-            <a:bodyPr rtlCol="0" anchor="ctr"/>
+            <a:bodyPr wrap="none" rtlCol="0">
+              <a:spAutoFit/>
+            </a:bodyPr>
             <a:lstStyle/>
             <a:p>
-              <a:pPr algn="ctr"/>
               <a:r>
                 <a:rPr lang="es-ES" dirty="0" smtClean="0"/>
-                <a:t>Nombre</a:t>
-              </a:r>
-            </a:p>
-          </p:txBody>
-        </p:sp>
-      </p:grpSp>
-      <p:cxnSp>
-        <p:nvCxnSpPr>
-          <p:cNvPr id="50" name="49 Conector recto"/>
-          <p:cNvCxnSpPr>
-            <a:stCxn id="48" idx="0"/>
-            <a:endCxn id="12" idx="2"/>
-          </p:cNvCxnSpPr>
-          <p:nvPr/>
-        </p:nvCxnSpPr>
-        <p:spPr>
-          <a:xfrm flipV="1">
-            <a:off x="1103184" y="4750081"/>
-            <a:ext cx="20572" cy="1010522"/>
-          </a:xfrm>
-          <a:prstGeom prst="line">
-            <a:avLst/>
-          </a:prstGeom>
-        </p:spPr>
-        <p:style>
-          <a:lnRef idx="1">
-            <a:schemeClr val="accent1"/>
-          </a:lnRef>
-          <a:fillRef idx="0">
-            <a:schemeClr val="accent1"/>
-          </a:fillRef>
-          <a:effectRef idx="0">
-            <a:schemeClr val="accent1"/>
-          </a:effectRef>
-          <a:fontRef idx="minor">
-            <a:schemeClr val="tx1"/>
-          </a:fontRef>
-        </p:style>
-      </p:cxnSp>
-      <p:sp>
-        <p:nvSpPr>
-          <p:cNvPr id="51" name="50 CuadroTexto"/>
-          <p:cNvSpPr txBox="1"/>
-          <p:nvPr/>
-        </p:nvSpPr>
-        <p:spPr>
-          <a:xfrm>
-            <a:off x="1053348" y="4707623"/>
-            <a:ext cx="314296" cy="923330"/>
-          </a:xfrm>
-          <a:prstGeom prst="rect">
-            <a:avLst/>
-          </a:prstGeom>
-          <a:noFill/>
-        </p:spPr>
-        <p:txBody>
-          <a:bodyPr wrap="square" rtlCol="0">
-            <a:spAutoFit/>
-          </a:bodyPr>
-          <a:lstStyle/>
-          <a:p>
-            <a:r>
-              <a:rPr lang="es-ES" dirty="0" smtClean="0"/>
-              <a:t>1</a:t>
-            </a:r>
-          </a:p>
-          <a:p>
-            <a:endParaRPr lang="es-ES" dirty="0" smtClean="0"/>
-          </a:p>
-          <a:p>
-            <a:r>
-              <a:rPr lang="es-ES" dirty="0"/>
-              <a:t>1</a:t>
-            </a:r>
-          </a:p>
-        </p:txBody>
-      </p:sp>
-      <p:grpSp>
-        <p:nvGrpSpPr>
-          <p:cNvPr id="54" name="53 Grupo"/>
-          <p:cNvGrpSpPr/>
-          <p:nvPr/>
-        </p:nvGrpSpPr>
-        <p:grpSpPr>
-          <a:xfrm>
-            <a:off x="4863866" y="5309915"/>
-            <a:ext cx="1800200" cy="1507738"/>
-            <a:chOff x="1128223" y="1988452"/>
-            <a:chExt cx="1656184" cy="731956"/>
-          </a:xfrm>
-        </p:grpSpPr>
-        <p:sp>
-          <p:nvSpPr>
-            <p:cNvPr id="55" name="54 Rectángulo"/>
-            <p:cNvSpPr/>
-            <p:nvPr/>
-          </p:nvSpPr>
-          <p:spPr>
-            <a:xfrm>
-              <a:off x="1128223" y="1988452"/>
-              <a:ext cx="1656184" cy="390880"/>
-            </a:xfrm>
-            <a:prstGeom prst="rect">
-              <a:avLst/>
-            </a:prstGeom>
-          </p:spPr>
-          <p:style>
-            <a:lnRef idx="2">
-              <a:schemeClr val="accent1"/>
-            </a:lnRef>
-            <a:fillRef idx="1">
-              <a:schemeClr val="lt1"/>
-            </a:fillRef>
-            <a:effectRef idx="0">
-              <a:schemeClr val="accent1"/>
-            </a:effectRef>
-            <a:fontRef idx="minor">
-              <a:schemeClr val="dk1"/>
-            </a:fontRef>
-          </p:style>
-          <p:txBody>
-            <a:bodyPr rtlCol="0" anchor="ctr"/>
-            <a:lstStyle/>
-            <a:p>
-              <a:pPr algn="ctr"/>
-              <a:r>
-                <a:rPr lang="es-ES" dirty="0" smtClean="0"/>
-                <a:t>Inventario</a:t>
+                <a:t>MODELO DE DOMINIO </a:t>
               </a:r>
               <a:endParaRPr lang="es-ES" dirty="0"/>
             </a:p>
           </p:txBody>
         </p:sp>
-        <p:sp>
-          <p:nvSpPr>
-            <p:cNvPr id="56" name="55 Rectángulo"/>
-            <p:cNvSpPr/>
-            <p:nvPr/>
-          </p:nvSpPr>
-          <p:spPr>
-            <a:xfrm>
-              <a:off x="1128223" y="2294378"/>
-              <a:ext cx="1656184" cy="426030"/>
-            </a:xfrm>
-            <a:prstGeom prst="rect">
-              <a:avLst/>
-            </a:prstGeom>
-          </p:spPr>
-          <p:style>
-            <a:lnRef idx="2">
-              <a:schemeClr val="accent1"/>
-            </a:lnRef>
-            <a:fillRef idx="1">
-              <a:schemeClr val="lt1"/>
-            </a:fillRef>
-            <a:effectRef idx="0">
-              <a:schemeClr val="accent1"/>
-            </a:effectRef>
-            <a:fontRef idx="minor">
-              <a:schemeClr val="dk1"/>
-            </a:fontRef>
-          </p:style>
-          <p:txBody>
-            <a:bodyPr rtlCol="0" anchor="ctr"/>
-            <a:lstStyle/>
-            <a:p>
-              <a:pPr algn="ctr"/>
-              <a:r>
-                <a:rPr lang="es-ES" dirty="0" smtClean="0"/>
-                <a:t>Fecha</a:t>
-              </a:r>
-            </a:p>
-            <a:p>
-              <a:pPr algn="ctr"/>
-              <a:r>
-                <a:rPr lang="es-ES" dirty="0" smtClean="0"/>
-                <a:t>Hora</a:t>
-              </a:r>
-            </a:p>
-          </p:txBody>
-        </p:sp>
       </p:grpSp>
-      <p:cxnSp>
-        <p:nvCxnSpPr>
-          <p:cNvPr id="58" name="57 Conector recto"/>
-          <p:cNvCxnSpPr>
-            <a:endCxn id="55" idx="0"/>
-          </p:cNvCxnSpPr>
-          <p:nvPr/>
-        </p:nvCxnSpPr>
-        <p:spPr>
-          <a:xfrm>
-            <a:off x="4348526" y="4643720"/>
-            <a:ext cx="1415440" cy="666195"/>
-          </a:xfrm>
-          <a:prstGeom prst="line">
-            <a:avLst/>
-          </a:prstGeom>
-        </p:spPr>
-        <p:style>
-          <a:lnRef idx="1">
-            <a:schemeClr val="accent1"/>
-          </a:lnRef>
-          <a:fillRef idx="0">
-            <a:schemeClr val="accent1"/>
-          </a:fillRef>
-          <a:effectRef idx="0">
-            <a:schemeClr val="accent1"/>
-          </a:effectRef>
-          <a:fontRef idx="minor">
-            <a:schemeClr val="tx1"/>
-          </a:fontRef>
-        </p:style>
-      </p:cxnSp>
-      <p:sp>
-        <p:nvSpPr>
-          <p:cNvPr id="59" name="58 CuadroTexto"/>
-          <p:cNvSpPr txBox="1"/>
-          <p:nvPr/>
-        </p:nvSpPr>
-        <p:spPr>
-          <a:xfrm>
-            <a:off x="5763966" y="4984622"/>
-            <a:ext cx="301686" cy="369332"/>
-          </a:xfrm>
-          <a:prstGeom prst="rect">
-            <a:avLst/>
-          </a:prstGeom>
-          <a:noFill/>
-        </p:spPr>
-        <p:txBody>
-          <a:bodyPr wrap="none" rtlCol="0">
-            <a:spAutoFit/>
-          </a:bodyPr>
-          <a:lstStyle/>
-          <a:p>
-            <a:r>
-              <a:rPr lang="es-ES" dirty="0" smtClean="0"/>
-              <a:t>1</a:t>
-            </a:r>
-            <a:endParaRPr lang="es-ES" dirty="0"/>
-          </a:p>
-        </p:txBody>
-      </p:sp>
-      <p:sp>
-        <p:nvSpPr>
-          <p:cNvPr id="63" name="62 CuadroTexto"/>
-          <p:cNvSpPr txBox="1"/>
-          <p:nvPr/>
-        </p:nvSpPr>
-        <p:spPr>
-          <a:xfrm>
-            <a:off x="4314084" y="4380749"/>
-            <a:ext cx="532518" cy="369332"/>
-          </a:xfrm>
-          <a:prstGeom prst="rect">
-            <a:avLst/>
-          </a:prstGeom>
-          <a:noFill/>
-        </p:spPr>
-        <p:txBody>
-          <a:bodyPr wrap="none" rtlCol="0">
-            <a:spAutoFit/>
-          </a:bodyPr>
-          <a:lstStyle/>
-          <a:p>
-            <a:r>
-              <a:rPr lang="es-ES" dirty="0" smtClean="0"/>
-              <a:t>1..*</a:t>
-            </a:r>
-            <a:endParaRPr lang="es-ES" dirty="0"/>
-          </a:p>
-        </p:txBody>
-      </p:sp>
-      <p:sp>
-        <p:nvSpPr>
-          <p:cNvPr id="2" name="1 CuadroTexto"/>
-          <p:cNvSpPr txBox="1"/>
-          <p:nvPr/>
-        </p:nvSpPr>
-        <p:spPr>
-          <a:xfrm>
-            <a:off x="3252051" y="188640"/>
-            <a:ext cx="2356479" cy="369332"/>
-          </a:xfrm>
-          <a:prstGeom prst="rect">
-            <a:avLst/>
-          </a:prstGeom>
-          <a:noFill/>
-        </p:spPr>
-        <p:txBody>
-          <a:bodyPr wrap="none" rtlCol="0">
-            <a:spAutoFit/>
-          </a:bodyPr>
-          <a:lstStyle/>
-          <a:p>
-            <a:r>
-              <a:rPr lang="es-ES" dirty="0" smtClean="0"/>
-              <a:t>MODELO DE DOMINIO </a:t>
-            </a:r>
-            <a:endParaRPr lang="es-ES" dirty="0"/>
-          </a:p>
-        </p:txBody>
-      </p:sp>
     </p:spTree>
     <p:extLst>
       <p:ext uri="{BB962C8B-B14F-4D97-AF65-F5344CB8AC3E}">

</xml_diff>